<commit_message>
Pass over section2; modified architecture figure
</commit_message>
<xml_diff>
--- a/figs.pptx
+++ b/figs.pptx
@@ -7,6 +7,7 @@
   <p:sldIdLst>
     <p:sldId id="256" r:id="rId2"/>
     <p:sldId id="257" r:id="rId3"/>
+    <p:sldId id="258" r:id="rId4"/>
   </p:sldIdLst>
   <p:sldSz cx="12192000" cy="6858000"/>
   <p:notesSz cx="6858000" cy="9144000"/>
@@ -244,7 +245,7 @@
           <a:p>
             <a:fld id="{FEB9F3C6-7DE9-0845-9093-50B66B4BEBAB}" type="datetimeFigureOut">
               <a:rPr lang="en-US" smtClean="0"/>
-              <a:t>7/17/16</a:t>
+              <a:t>7/29/16</a:t>
             </a:fld>
             <a:endParaRPr lang="en-US"/>
           </a:p>
@@ -414,7 +415,7 @@
           <a:p>
             <a:fld id="{FEB9F3C6-7DE9-0845-9093-50B66B4BEBAB}" type="datetimeFigureOut">
               <a:rPr lang="en-US" smtClean="0"/>
-              <a:t>7/17/16</a:t>
+              <a:t>7/29/16</a:t>
             </a:fld>
             <a:endParaRPr lang="en-US"/>
           </a:p>
@@ -594,7 +595,7 @@
           <a:p>
             <a:fld id="{FEB9F3C6-7DE9-0845-9093-50B66B4BEBAB}" type="datetimeFigureOut">
               <a:rPr lang="en-US" smtClean="0"/>
-              <a:t>7/17/16</a:t>
+              <a:t>7/29/16</a:t>
             </a:fld>
             <a:endParaRPr lang="en-US"/>
           </a:p>
@@ -764,7 +765,7 @@
           <a:p>
             <a:fld id="{FEB9F3C6-7DE9-0845-9093-50B66B4BEBAB}" type="datetimeFigureOut">
               <a:rPr lang="en-US" smtClean="0"/>
-              <a:t>7/17/16</a:t>
+              <a:t>7/29/16</a:t>
             </a:fld>
             <a:endParaRPr lang="en-US"/>
           </a:p>
@@ -1010,7 +1011,7 @@
           <a:p>
             <a:fld id="{FEB9F3C6-7DE9-0845-9093-50B66B4BEBAB}" type="datetimeFigureOut">
               <a:rPr lang="en-US" smtClean="0"/>
-              <a:t>7/17/16</a:t>
+              <a:t>7/29/16</a:t>
             </a:fld>
             <a:endParaRPr lang="en-US"/>
           </a:p>
@@ -1242,7 +1243,7 @@
           <a:p>
             <a:fld id="{FEB9F3C6-7DE9-0845-9093-50B66B4BEBAB}" type="datetimeFigureOut">
               <a:rPr lang="en-US" smtClean="0"/>
-              <a:t>7/17/16</a:t>
+              <a:t>7/29/16</a:t>
             </a:fld>
             <a:endParaRPr lang="en-US"/>
           </a:p>
@@ -1609,7 +1610,7 @@
           <a:p>
             <a:fld id="{FEB9F3C6-7DE9-0845-9093-50B66B4BEBAB}" type="datetimeFigureOut">
               <a:rPr lang="en-US" smtClean="0"/>
-              <a:t>7/17/16</a:t>
+              <a:t>7/29/16</a:t>
             </a:fld>
             <a:endParaRPr lang="en-US"/>
           </a:p>
@@ -1727,7 +1728,7 @@
           <a:p>
             <a:fld id="{FEB9F3C6-7DE9-0845-9093-50B66B4BEBAB}" type="datetimeFigureOut">
               <a:rPr lang="en-US" smtClean="0"/>
-              <a:t>7/17/16</a:t>
+              <a:t>7/29/16</a:t>
             </a:fld>
             <a:endParaRPr lang="en-US"/>
           </a:p>
@@ -1822,7 +1823,7 @@
           <a:p>
             <a:fld id="{FEB9F3C6-7DE9-0845-9093-50B66B4BEBAB}" type="datetimeFigureOut">
               <a:rPr lang="en-US" smtClean="0"/>
-              <a:t>7/17/16</a:t>
+              <a:t>7/29/16</a:t>
             </a:fld>
             <a:endParaRPr lang="en-US"/>
           </a:p>
@@ -2099,7 +2100,7 @@
           <a:p>
             <a:fld id="{FEB9F3C6-7DE9-0845-9093-50B66B4BEBAB}" type="datetimeFigureOut">
               <a:rPr lang="en-US" smtClean="0"/>
-              <a:t>7/17/16</a:t>
+              <a:t>7/29/16</a:t>
             </a:fld>
             <a:endParaRPr lang="en-US"/>
           </a:p>
@@ -2352,7 +2353,7 @@
           <a:p>
             <a:fld id="{FEB9F3C6-7DE9-0845-9093-50B66B4BEBAB}" type="datetimeFigureOut">
               <a:rPr lang="en-US" smtClean="0"/>
-              <a:t>7/17/16</a:t>
+              <a:t>7/29/16</a:t>
             </a:fld>
             <a:endParaRPr lang="en-US"/>
           </a:p>
@@ -2565,7 +2566,7 @@
           <a:p>
             <a:fld id="{FEB9F3C6-7DE9-0845-9093-50B66B4BEBAB}" type="datetimeFigureOut">
               <a:rPr lang="en-US" smtClean="0"/>
-              <a:t>7/17/16</a:t>
+              <a:t>7/29/16</a:t>
             </a:fld>
             <a:endParaRPr lang="en-US"/>
           </a:p>
@@ -5701,6 +5702,1635 @@
 </p:sld>
 </file>
 
+<file path=ppt/slides/slide3.xml><?xml version="1.0" encoding="utf-8"?>
+<p:sld xmlns:a="http://schemas.openxmlformats.org/drawingml/2006/main" xmlns:r="http://schemas.openxmlformats.org/officeDocument/2006/relationships" xmlns:p="http://schemas.openxmlformats.org/presentationml/2006/main">
+  <p:cSld>
+    <p:spTree>
+      <p:nvGrpSpPr>
+        <p:cNvPr id="1" name=""/>
+        <p:cNvGrpSpPr/>
+        <p:nvPr/>
+      </p:nvGrpSpPr>
+      <p:grpSpPr>
+        <a:xfrm>
+          <a:off x="0" y="0"/>
+          <a:ext cx="0" cy="0"/>
+          <a:chOff x="0" y="0"/>
+          <a:chExt cx="0" cy="0"/>
+        </a:xfrm>
+      </p:grpSpPr>
+      <p:grpSp>
+        <p:nvGrpSpPr>
+          <p:cNvPr id="6" name="Group 5"/>
+          <p:cNvGrpSpPr/>
+          <p:nvPr/>
+        </p:nvGrpSpPr>
+        <p:grpSpPr>
+          <a:xfrm>
+            <a:off x="1077132" y="558596"/>
+            <a:ext cx="9520318" cy="6174571"/>
+            <a:chOff x="1077132" y="558596"/>
+            <a:chExt cx="9520318" cy="6174571"/>
+          </a:xfrm>
+        </p:grpSpPr>
+        <p:sp>
+          <p:nvSpPr>
+            <p:cNvPr id="4" name="Rectangle 3"/>
+            <p:cNvSpPr/>
+            <p:nvPr/>
+          </p:nvSpPr>
+          <p:spPr>
+            <a:xfrm>
+              <a:off x="2809288" y="3374805"/>
+              <a:ext cx="4588572" cy="1135201"/>
+            </a:xfrm>
+            <a:prstGeom prst="rect">
+              <a:avLst/>
+            </a:prstGeom>
+            <a:ln>
+              <a:noFill/>
+            </a:ln>
+          </p:spPr>
+          <p:style>
+            <a:lnRef idx="2">
+              <a:schemeClr val="accent1">
+                <a:shade val="50000"/>
+              </a:schemeClr>
+            </a:lnRef>
+            <a:fillRef idx="1">
+              <a:schemeClr val="accent1"/>
+            </a:fillRef>
+            <a:effectRef idx="0">
+              <a:schemeClr val="accent1"/>
+            </a:effectRef>
+            <a:fontRef idx="minor">
+              <a:schemeClr val="lt1"/>
+            </a:fontRef>
+          </p:style>
+          <p:txBody>
+            <a:bodyPr tIns="0" bIns="1005840" rtlCol="0" anchor="ctr"/>
+            <a:lstStyle/>
+            <a:p>
+              <a:pPr algn="ctr"/>
+              <a:endParaRPr lang="en-US" sz="2400" dirty="0" smtClean="0"/>
+            </a:p>
+            <a:p>
+              <a:pPr algn="ctr"/>
+              <a:r>
+                <a:rPr lang="en-US" sz="2400" dirty="0" smtClean="0"/>
+                <a:t>Discovery</a:t>
+              </a:r>
+              <a:endParaRPr lang="en-US" sz="2400" dirty="0"/>
+            </a:p>
+          </p:txBody>
+        </p:sp>
+        <p:sp>
+          <p:nvSpPr>
+            <p:cNvPr id="7" name="Cloud 6"/>
+            <p:cNvSpPr/>
+            <p:nvPr/>
+          </p:nvSpPr>
+          <p:spPr>
+            <a:xfrm>
+              <a:off x="1316751" y="5260828"/>
+              <a:ext cx="2448732" cy="1472339"/>
+            </a:xfrm>
+            <a:prstGeom prst="cloud">
+              <a:avLst/>
+            </a:prstGeom>
+          </p:spPr>
+          <p:style>
+            <a:lnRef idx="2">
+              <a:schemeClr val="accent1">
+                <a:shade val="50000"/>
+              </a:schemeClr>
+            </a:lnRef>
+            <a:fillRef idx="1">
+              <a:schemeClr val="accent1"/>
+            </a:fillRef>
+            <a:effectRef idx="0">
+              <a:schemeClr val="accent1"/>
+            </a:effectRef>
+            <a:fontRef idx="minor">
+              <a:schemeClr val="lt1"/>
+            </a:fontRef>
+          </p:style>
+          <p:txBody>
+            <a:bodyPr rtlCol="0" anchor="ctr"/>
+            <a:lstStyle/>
+            <a:p>
+              <a:pPr algn="ctr"/>
+              <a:endParaRPr lang="en-US" dirty="0" smtClean="0"/>
+            </a:p>
+            <a:p>
+              <a:pPr algn="ctr"/>
+              <a:endParaRPr lang="en-US" dirty="0"/>
+            </a:p>
+            <a:p>
+              <a:pPr algn="ctr"/>
+              <a:endParaRPr lang="en-US" dirty="0" smtClean="0"/>
+            </a:p>
+            <a:p>
+              <a:pPr algn="ctr"/>
+              <a:r>
+                <a:rPr lang="en-US" dirty="0" smtClean="0"/>
+                <a:t>Silo 1</a:t>
+              </a:r>
+            </a:p>
+          </p:txBody>
+        </p:sp>
+        <p:sp>
+          <p:nvSpPr>
+            <p:cNvPr id="8" name="Cloud 7"/>
+            <p:cNvSpPr/>
+            <p:nvPr/>
+          </p:nvSpPr>
+          <p:spPr>
+            <a:xfrm>
+              <a:off x="4521849" y="5260828"/>
+              <a:ext cx="2586873" cy="1472339"/>
+            </a:xfrm>
+            <a:prstGeom prst="cloud">
+              <a:avLst/>
+            </a:prstGeom>
+          </p:spPr>
+          <p:style>
+            <a:lnRef idx="2">
+              <a:schemeClr val="accent1">
+                <a:shade val="50000"/>
+              </a:schemeClr>
+            </a:lnRef>
+            <a:fillRef idx="1">
+              <a:schemeClr val="accent1"/>
+            </a:fillRef>
+            <a:effectRef idx="0">
+              <a:schemeClr val="accent1"/>
+            </a:effectRef>
+            <a:fontRef idx="minor">
+              <a:schemeClr val="lt1"/>
+            </a:fontRef>
+          </p:style>
+          <p:txBody>
+            <a:bodyPr rtlCol="0" anchor="ctr"/>
+            <a:lstStyle/>
+            <a:p>
+              <a:pPr algn="ctr"/>
+              <a:endParaRPr lang="en-US" dirty="0"/>
+            </a:p>
+            <a:p>
+              <a:pPr algn="ctr"/>
+              <a:endParaRPr lang="en-US" dirty="0" smtClean="0"/>
+            </a:p>
+            <a:p>
+              <a:pPr algn="ctr"/>
+              <a:endParaRPr lang="en-US" dirty="0"/>
+            </a:p>
+            <a:p>
+              <a:pPr algn="ctr"/>
+              <a:r>
+                <a:rPr lang="en-US" dirty="0" smtClean="0"/>
+                <a:t>Silo 2</a:t>
+              </a:r>
+              <a:endParaRPr lang="en-US" dirty="0"/>
+            </a:p>
+          </p:txBody>
+        </p:sp>
+        <p:sp>
+          <p:nvSpPr>
+            <p:cNvPr id="10" name="Can 9"/>
+            <p:cNvSpPr/>
+            <p:nvPr/>
+          </p:nvSpPr>
+          <p:spPr>
+            <a:xfrm>
+              <a:off x="1943967" y="5591457"/>
+              <a:ext cx="387458" cy="542441"/>
+            </a:xfrm>
+            <a:prstGeom prst="can">
+              <a:avLst/>
+            </a:prstGeom>
+            <a:solidFill>
+              <a:schemeClr val="accent2"/>
+            </a:solidFill>
+          </p:spPr>
+          <p:style>
+            <a:lnRef idx="2">
+              <a:schemeClr val="accent1">
+                <a:shade val="50000"/>
+              </a:schemeClr>
+            </a:lnRef>
+            <a:fillRef idx="1">
+              <a:schemeClr val="accent1"/>
+            </a:fillRef>
+            <a:effectRef idx="0">
+              <a:schemeClr val="accent1"/>
+            </a:effectRef>
+            <a:fontRef idx="minor">
+              <a:schemeClr val="lt1"/>
+            </a:fontRef>
+          </p:style>
+          <p:txBody>
+            <a:bodyPr rtlCol="0" anchor="ctr"/>
+            <a:lstStyle/>
+            <a:p>
+              <a:pPr algn="ctr"/>
+              <a:endParaRPr lang="en-US"/>
+            </a:p>
+          </p:txBody>
+        </p:sp>
+        <p:sp>
+          <p:nvSpPr>
+            <p:cNvPr id="11" name="Can 10"/>
+            <p:cNvSpPr/>
+            <p:nvPr/>
+          </p:nvSpPr>
+          <p:spPr>
+            <a:xfrm>
+              <a:off x="2421830" y="5619872"/>
+              <a:ext cx="387458" cy="542441"/>
+            </a:xfrm>
+            <a:prstGeom prst="can">
+              <a:avLst/>
+            </a:prstGeom>
+            <a:solidFill>
+              <a:schemeClr val="accent2"/>
+            </a:solidFill>
+          </p:spPr>
+          <p:style>
+            <a:lnRef idx="2">
+              <a:schemeClr val="accent1">
+                <a:shade val="50000"/>
+              </a:schemeClr>
+            </a:lnRef>
+            <a:fillRef idx="1">
+              <a:schemeClr val="accent1"/>
+            </a:fillRef>
+            <a:effectRef idx="0">
+              <a:schemeClr val="accent1"/>
+            </a:effectRef>
+            <a:fontRef idx="minor">
+              <a:schemeClr val="lt1"/>
+            </a:fontRef>
+          </p:style>
+          <p:txBody>
+            <a:bodyPr rtlCol="0" anchor="ctr"/>
+            <a:lstStyle/>
+            <a:p>
+              <a:pPr algn="ctr"/>
+              <a:endParaRPr lang="en-US"/>
+            </a:p>
+          </p:txBody>
+        </p:sp>
+        <p:sp>
+          <p:nvSpPr>
+            <p:cNvPr id="12" name="Can 11"/>
+            <p:cNvSpPr/>
+            <p:nvPr/>
+          </p:nvSpPr>
+          <p:spPr>
+            <a:xfrm>
+              <a:off x="2979774" y="5666365"/>
+              <a:ext cx="387458" cy="542441"/>
+            </a:xfrm>
+            <a:prstGeom prst="can">
+              <a:avLst/>
+            </a:prstGeom>
+            <a:solidFill>
+              <a:schemeClr val="accent2"/>
+            </a:solidFill>
+          </p:spPr>
+          <p:style>
+            <a:lnRef idx="2">
+              <a:schemeClr val="accent1">
+                <a:shade val="50000"/>
+              </a:schemeClr>
+            </a:lnRef>
+            <a:fillRef idx="1">
+              <a:schemeClr val="accent1"/>
+            </a:fillRef>
+            <a:effectRef idx="0">
+              <a:schemeClr val="accent1"/>
+            </a:effectRef>
+            <a:fontRef idx="minor">
+              <a:schemeClr val="lt1"/>
+            </a:fontRef>
+          </p:style>
+          <p:txBody>
+            <a:bodyPr rtlCol="0" anchor="ctr"/>
+            <a:lstStyle/>
+            <a:p>
+              <a:pPr algn="ctr"/>
+              <a:endParaRPr lang="en-US"/>
+            </a:p>
+          </p:txBody>
+        </p:sp>
+        <p:sp>
+          <p:nvSpPr>
+            <p:cNvPr id="13" name="Can 12"/>
+            <p:cNvSpPr/>
+            <p:nvPr/>
+          </p:nvSpPr>
+          <p:spPr>
+            <a:xfrm>
+              <a:off x="4976476" y="5622703"/>
+              <a:ext cx="387458" cy="542441"/>
+            </a:xfrm>
+            <a:prstGeom prst="can">
+              <a:avLst/>
+            </a:prstGeom>
+            <a:solidFill>
+              <a:schemeClr val="accent2"/>
+            </a:solidFill>
+          </p:spPr>
+          <p:style>
+            <a:lnRef idx="2">
+              <a:schemeClr val="accent1">
+                <a:shade val="50000"/>
+              </a:schemeClr>
+            </a:lnRef>
+            <a:fillRef idx="1">
+              <a:schemeClr val="accent1"/>
+            </a:fillRef>
+            <a:effectRef idx="0">
+              <a:schemeClr val="accent1"/>
+            </a:effectRef>
+            <a:fontRef idx="minor">
+              <a:schemeClr val="lt1"/>
+            </a:fontRef>
+          </p:style>
+          <p:txBody>
+            <a:bodyPr rtlCol="0" anchor="ctr"/>
+            <a:lstStyle/>
+            <a:p>
+              <a:pPr algn="ctr"/>
+              <a:endParaRPr lang="en-US"/>
+            </a:p>
+          </p:txBody>
+        </p:sp>
+        <p:sp>
+          <p:nvSpPr>
+            <p:cNvPr id="14" name="Can 13"/>
+            <p:cNvSpPr/>
+            <p:nvPr/>
+          </p:nvSpPr>
+          <p:spPr>
+            <a:xfrm>
+              <a:off x="5454339" y="5651118"/>
+              <a:ext cx="387458" cy="542441"/>
+            </a:xfrm>
+            <a:prstGeom prst="can">
+              <a:avLst/>
+            </a:prstGeom>
+            <a:solidFill>
+              <a:schemeClr val="accent2"/>
+            </a:solidFill>
+          </p:spPr>
+          <p:style>
+            <a:lnRef idx="2">
+              <a:schemeClr val="accent1">
+                <a:shade val="50000"/>
+              </a:schemeClr>
+            </a:lnRef>
+            <a:fillRef idx="1">
+              <a:schemeClr val="accent1"/>
+            </a:fillRef>
+            <a:effectRef idx="0">
+              <a:schemeClr val="accent1"/>
+            </a:effectRef>
+            <a:fontRef idx="minor">
+              <a:schemeClr val="lt1"/>
+            </a:fontRef>
+          </p:style>
+          <p:txBody>
+            <a:bodyPr rtlCol="0" anchor="ctr"/>
+            <a:lstStyle/>
+            <a:p>
+              <a:pPr algn="ctr"/>
+              <a:endParaRPr lang="en-US"/>
+            </a:p>
+          </p:txBody>
+        </p:sp>
+        <p:sp>
+          <p:nvSpPr>
+            <p:cNvPr id="15" name="Can 14"/>
+            <p:cNvSpPr/>
+            <p:nvPr/>
+          </p:nvSpPr>
+          <p:spPr>
+            <a:xfrm>
+              <a:off x="6012283" y="5697611"/>
+              <a:ext cx="387458" cy="542441"/>
+            </a:xfrm>
+            <a:prstGeom prst="can">
+              <a:avLst/>
+            </a:prstGeom>
+            <a:solidFill>
+              <a:schemeClr val="accent2"/>
+            </a:solidFill>
+          </p:spPr>
+          <p:style>
+            <a:lnRef idx="2">
+              <a:schemeClr val="accent1">
+                <a:shade val="50000"/>
+              </a:schemeClr>
+            </a:lnRef>
+            <a:fillRef idx="1">
+              <a:schemeClr val="accent1"/>
+            </a:fillRef>
+            <a:effectRef idx="0">
+              <a:schemeClr val="accent1"/>
+            </a:effectRef>
+            <a:fontRef idx="minor">
+              <a:schemeClr val="lt1"/>
+            </a:fontRef>
+          </p:style>
+          <p:txBody>
+            <a:bodyPr rtlCol="0" anchor="ctr"/>
+            <a:lstStyle/>
+            <a:p>
+              <a:pPr algn="ctr"/>
+              <a:endParaRPr lang="en-US"/>
+            </a:p>
+          </p:txBody>
+        </p:sp>
+        <p:sp>
+          <p:nvSpPr>
+            <p:cNvPr id="24" name="Can 23"/>
+            <p:cNvSpPr/>
+            <p:nvPr/>
+          </p:nvSpPr>
+          <p:spPr>
+            <a:xfrm>
+              <a:off x="8071226" y="2019706"/>
+              <a:ext cx="2526224" cy="2810938"/>
+            </a:xfrm>
+            <a:prstGeom prst="can">
+              <a:avLst/>
+            </a:prstGeom>
+          </p:spPr>
+          <p:style>
+            <a:lnRef idx="2">
+              <a:schemeClr val="accent1">
+                <a:shade val="50000"/>
+              </a:schemeClr>
+            </a:lnRef>
+            <a:fillRef idx="1">
+              <a:schemeClr val="accent1"/>
+            </a:fillRef>
+            <a:effectRef idx="0">
+              <a:schemeClr val="accent1"/>
+            </a:effectRef>
+            <a:fontRef idx="minor">
+              <a:schemeClr val="lt1"/>
+            </a:fontRef>
+          </p:style>
+          <p:txBody>
+            <a:bodyPr rtlCol="0" anchor="ctr"/>
+            <a:lstStyle/>
+            <a:p>
+              <a:pPr algn="ctr"/>
+              <a:r>
+                <a:rPr lang="en-US" sz="2400" dirty="0" smtClean="0"/>
+                <a:t>Linkage Graph</a:t>
+              </a:r>
+            </a:p>
+            <a:p>
+              <a:pPr algn="ctr"/>
+              <a:endParaRPr lang="en-US" sz="2400" dirty="0"/>
+            </a:p>
+            <a:p>
+              <a:pPr algn="ctr"/>
+              <a:endParaRPr lang="en-US" sz="2400" dirty="0" smtClean="0"/>
+            </a:p>
+            <a:p>
+              <a:pPr algn="ctr"/>
+              <a:endParaRPr lang="en-US" sz="2400" dirty="0"/>
+            </a:p>
+            <a:p>
+              <a:pPr algn="ctr"/>
+              <a:endParaRPr lang="en-US" sz="2400" dirty="0"/>
+            </a:p>
+          </p:txBody>
+        </p:sp>
+        <p:grpSp>
+          <p:nvGrpSpPr>
+            <p:cNvPr id="48" name="Group 47"/>
+            <p:cNvGrpSpPr/>
+            <p:nvPr/>
+          </p:nvGrpSpPr>
+          <p:grpSpPr>
+            <a:xfrm>
+              <a:off x="8501134" y="3262443"/>
+              <a:ext cx="1595787" cy="865322"/>
+              <a:chOff x="8384583" y="604434"/>
+              <a:chExt cx="1595787" cy="865322"/>
+            </a:xfrm>
+          </p:grpSpPr>
+          <p:sp>
+            <p:nvSpPr>
+              <p:cNvPr id="25" name="Oval 24"/>
+              <p:cNvSpPr/>
+              <p:nvPr/>
+            </p:nvSpPr>
+            <p:spPr>
+              <a:xfrm>
+                <a:off x="8384583" y="604434"/>
+                <a:ext cx="237644" cy="232474"/>
+              </a:xfrm>
+              <a:prstGeom prst="ellipse">
+                <a:avLst/>
+              </a:prstGeom>
+              <a:solidFill>
+                <a:schemeClr val="accent2"/>
+              </a:solidFill>
+              <a:ln>
+                <a:solidFill>
+                  <a:schemeClr val="accent2"/>
+                </a:solidFill>
+              </a:ln>
+            </p:spPr>
+            <p:style>
+              <a:lnRef idx="2">
+                <a:schemeClr val="accent1">
+                  <a:shade val="50000"/>
+                </a:schemeClr>
+              </a:lnRef>
+              <a:fillRef idx="1">
+                <a:schemeClr val="accent1"/>
+              </a:fillRef>
+              <a:effectRef idx="0">
+                <a:schemeClr val="accent1"/>
+              </a:effectRef>
+              <a:fontRef idx="minor">
+                <a:schemeClr val="lt1"/>
+              </a:fontRef>
+            </p:style>
+            <p:txBody>
+              <a:bodyPr rtlCol="0" anchor="ctr"/>
+              <a:lstStyle/>
+              <a:p>
+                <a:pPr algn="ctr"/>
+                <a:endParaRPr lang="en-US" dirty="0">
+                  <a:solidFill>
+                    <a:schemeClr val="accent2"/>
+                  </a:solidFill>
+                </a:endParaRPr>
+              </a:p>
+            </p:txBody>
+          </p:sp>
+          <p:cxnSp>
+            <p:nvCxnSpPr>
+              <p:cNvPr id="27" name="Straight Connector 26"/>
+              <p:cNvCxnSpPr>
+                <a:stCxn id="25" idx="4"/>
+                <a:endCxn id="34" idx="2"/>
+              </p:cNvCxnSpPr>
+              <p:nvPr/>
+            </p:nvCxnSpPr>
+            <p:spPr>
+              <a:xfrm>
+                <a:off x="8503405" y="836908"/>
+                <a:ext cx="508858" cy="516611"/>
+              </a:xfrm>
+              <a:prstGeom prst="line">
+                <a:avLst/>
+              </a:prstGeom>
+              <a:ln>
+                <a:solidFill>
+                  <a:schemeClr val="accent2"/>
+                </a:solidFill>
+              </a:ln>
+            </p:spPr>
+            <p:style>
+              <a:lnRef idx="1">
+                <a:schemeClr val="accent1"/>
+              </a:lnRef>
+              <a:fillRef idx="0">
+                <a:schemeClr val="accent1"/>
+              </a:fillRef>
+              <a:effectRef idx="0">
+                <a:schemeClr val="accent1"/>
+              </a:effectRef>
+              <a:fontRef idx="minor">
+                <a:schemeClr val="tx1"/>
+              </a:fontRef>
+            </p:style>
+          </p:cxnSp>
+          <p:sp>
+            <p:nvSpPr>
+              <p:cNvPr id="29" name="Oval 28"/>
+              <p:cNvSpPr/>
+              <p:nvPr/>
+            </p:nvSpPr>
+            <p:spPr>
+              <a:xfrm>
+                <a:off x="9450835" y="870726"/>
+                <a:ext cx="237644" cy="232474"/>
+              </a:xfrm>
+              <a:prstGeom prst="ellipse">
+                <a:avLst/>
+              </a:prstGeom>
+              <a:solidFill>
+                <a:schemeClr val="accent2"/>
+              </a:solidFill>
+              <a:ln>
+                <a:solidFill>
+                  <a:schemeClr val="accent2"/>
+                </a:solidFill>
+              </a:ln>
+            </p:spPr>
+            <p:style>
+              <a:lnRef idx="2">
+                <a:schemeClr val="accent1">
+                  <a:shade val="50000"/>
+                </a:schemeClr>
+              </a:lnRef>
+              <a:fillRef idx="1">
+                <a:schemeClr val="accent1"/>
+              </a:fillRef>
+              <a:effectRef idx="0">
+                <a:schemeClr val="accent1"/>
+              </a:effectRef>
+              <a:fontRef idx="minor">
+                <a:schemeClr val="lt1"/>
+              </a:fontRef>
+            </p:style>
+            <p:txBody>
+              <a:bodyPr rtlCol="0" anchor="ctr"/>
+              <a:lstStyle/>
+              <a:p>
+                <a:pPr algn="ctr"/>
+                <a:endParaRPr lang="en-US">
+                  <a:solidFill>
+                    <a:schemeClr val="accent2"/>
+                  </a:solidFill>
+                </a:endParaRPr>
+              </a:p>
+            </p:txBody>
+          </p:sp>
+          <p:sp>
+            <p:nvSpPr>
+              <p:cNvPr id="30" name="Oval 29"/>
+              <p:cNvSpPr/>
+              <p:nvPr/>
+            </p:nvSpPr>
+            <p:spPr>
+              <a:xfrm>
+                <a:off x="9742726" y="1125803"/>
+                <a:ext cx="237644" cy="232474"/>
+              </a:xfrm>
+              <a:prstGeom prst="ellipse">
+                <a:avLst/>
+              </a:prstGeom>
+              <a:solidFill>
+                <a:schemeClr val="accent2"/>
+              </a:solidFill>
+              <a:ln>
+                <a:solidFill>
+                  <a:schemeClr val="accent2"/>
+                </a:solidFill>
+              </a:ln>
+            </p:spPr>
+            <p:style>
+              <a:lnRef idx="2">
+                <a:schemeClr val="accent1">
+                  <a:shade val="50000"/>
+                </a:schemeClr>
+              </a:lnRef>
+              <a:fillRef idx="1">
+                <a:schemeClr val="accent1"/>
+              </a:fillRef>
+              <a:effectRef idx="0">
+                <a:schemeClr val="accent1"/>
+              </a:effectRef>
+              <a:fontRef idx="minor">
+                <a:schemeClr val="lt1"/>
+              </a:fontRef>
+            </p:style>
+            <p:txBody>
+              <a:bodyPr rtlCol="0" anchor="ctr"/>
+              <a:lstStyle/>
+              <a:p>
+                <a:pPr algn="ctr"/>
+                <a:endParaRPr lang="en-US">
+                  <a:solidFill>
+                    <a:schemeClr val="accent2"/>
+                  </a:solidFill>
+                </a:endParaRPr>
+              </a:p>
+            </p:txBody>
+          </p:sp>
+          <p:sp>
+            <p:nvSpPr>
+              <p:cNvPr id="31" name="Oval 30"/>
+              <p:cNvSpPr/>
+              <p:nvPr/>
+            </p:nvSpPr>
+            <p:spPr>
+              <a:xfrm>
+                <a:off x="8937353" y="697425"/>
+                <a:ext cx="237644" cy="232474"/>
+              </a:xfrm>
+              <a:prstGeom prst="ellipse">
+                <a:avLst/>
+              </a:prstGeom>
+              <a:solidFill>
+                <a:schemeClr val="accent2"/>
+              </a:solidFill>
+              <a:ln>
+                <a:solidFill>
+                  <a:schemeClr val="accent2"/>
+                </a:solidFill>
+              </a:ln>
+            </p:spPr>
+            <p:style>
+              <a:lnRef idx="2">
+                <a:schemeClr val="accent1">
+                  <a:shade val="50000"/>
+                </a:schemeClr>
+              </a:lnRef>
+              <a:fillRef idx="1">
+                <a:schemeClr val="accent1"/>
+              </a:fillRef>
+              <a:effectRef idx="0">
+                <a:schemeClr val="accent1"/>
+              </a:effectRef>
+              <a:fontRef idx="minor">
+                <a:schemeClr val="lt1"/>
+              </a:fontRef>
+            </p:style>
+            <p:txBody>
+              <a:bodyPr rtlCol="0" anchor="ctr"/>
+              <a:lstStyle/>
+              <a:p>
+                <a:pPr algn="ctr"/>
+                <a:endParaRPr lang="en-US">
+                  <a:solidFill>
+                    <a:schemeClr val="accent2"/>
+                  </a:solidFill>
+                </a:endParaRPr>
+              </a:p>
+            </p:txBody>
+          </p:sp>
+          <p:sp>
+            <p:nvSpPr>
+              <p:cNvPr id="34" name="Oval 33"/>
+              <p:cNvSpPr/>
+              <p:nvPr/>
+            </p:nvSpPr>
+            <p:spPr>
+              <a:xfrm>
+                <a:off x="9012263" y="1237282"/>
+                <a:ext cx="237644" cy="232474"/>
+              </a:xfrm>
+              <a:prstGeom prst="ellipse">
+                <a:avLst/>
+              </a:prstGeom>
+              <a:solidFill>
+                <a:schemeClr val="accent2"/>
+              </a:solidFill>
+              <a:ln>
+                <a:solidFill>
+                  <a:schemeClr val="accent2"/>
+                </a:solidFill>
+              </a:ln>
+            </p:spPr>
+            <p:style>
+              <a:lnRef idx="2">
+                <a:schemeClr val="accent1">
+                  <a:shade val="50000"/>
+                </a:schemeClr>
+              </a:lnRef>
+              <a:fillRef idx="1">
+                <a:schemeClr val="accent1"/>
+              </a:fillRef>
+              <a:effectRef idx="0">
+                <a:schemeClr val="accent1"/>
+              </a:effectRef>
+              <a:fontRef idx="minor">
+                <a:schemeClr val="lt1"/>
+              </a:fontRef>
+            </p:style>
+            <p:txBody>
+              <a:bodyPr rtlCol="0" anchor="ctr"/>
+              <a:lstStyle/>
+              <a:p>
+                <a:pPr algn="ctr"/>
+                <a:endParaRPr lang="en-US">
+                  <a:solidFill>
+                    <a:schemeClr val="accent2"/>
+                  </a:solidFill>
+                </a:endParaRPr>
+              </a:p>
+            </p:txBody>
+          </p:sp>
+          <p:cxnSp>
+            <p:nvCxnSpPr>
+              <p:cNvPr id="38" name="Straight Connector 37"/>
+              <p:cNvCxnSpPr>
+                <a:stCxn id="25" idx="6"/>
+                <a:endCxn id="31" idx="2"/>
+              </p:cNvCxnSpPr>
+              <p:nvPr/>
+            </p:nvCxnSpPr>
+            <p:spPr>
+              <a:xfrm>
+                <a:off x="8622227" y="720671"/>
+                <a:ext cx="315126" cy="92991"/>
+              </a:xfrm>
+              <a:prstGeom prst="line">
+                <a:avLst/>
+              </a:prstGeom>
+              <a:ln>
+                <a:solidFill>
+                  <a:schemeClr val="accent2"/>
+                </a:solidFill>
+              </a:ln>
+            </p:spPr>
+            <p:style>
+              <a:lnRef idx="1">
+                <a:schemeClr val="accent1"/>
+              </a:lnRef>
+              <a:fillRef idx="0">
+                <a:schemeClr val="accent1"/>
+              </a:fillRef>
+              <a:effectRef idx="0">
+                <a:schemeClr val="accent1"/>
+              </a:effectRef>
+              <a:fontRef idx="minor">
+                <a:schemeClr val="tx1"/>
+              </a:fontRef>
+            </p:style>
+          </p:cxnSp>
+          <p:cxnSp>
+            <p:nvCxnSpPr>
+              <p:cNvPr id="40" name="Straight Connector 39"/>
+              <p:cNvCxnSpPr>
+                <a:stCxn id="31" idx="5"/>
+                <a:endCxn id="34" idx="0"/>
+              </p:cNvCxnSpPr>
+              <p:nvPr/>
+            </p:nvCxnSpPr>
+            <p:spPr>
+              <a:xfrm flipH="1">
+                <a:off x="9131085" y="895854"/>
+                <a:ext cx="9110" cy="341428"/>
+              </a:xfrm>
+              <a:prstGeom prst="line">
+                <a:avLst/>
+              </a:prstGeom>
+              <a:ln>
+                <a:solidFill>
+                  <a:schemeClr val="accent2"/>
+                </a:solidFill>
+              </a:ln>
+            </p:spPr>
+            <p:style>
+              <a:lnRef idx="1">
+                <a:schemeClr val="accent1"/>
+              </a:lnRef>
+              <a:fillRef idx="0">
+                <a:schemeClr val="accent1"/>
+              </a:fillRef>
+              <a:effectRef idx="0">
+                <a:schemeClr val="accent1"/>
+              </a:effectRef>
+              <a:fontRef idx="minor">
+                <a:schemeClr val="tx1"/>
+              </a:fontRef>
+            </p:style>
+          </p:cxnSp>
+          <p:cxnSp>
+            <p:nvCxnSpPr>
+              <p:cNvPr id="46" name="Straight Connector 45"/>
+              <p:cNvCxnSpPr>
+                <a:stCxn id="29" idx="4"/>
+                <a:endCxn id="30" idx="5"/>
+              </p:cNvCxnSpPr>
+              <p:nvPr/>
+            </p:nvCxnSpPr>
+            <p:spPr>
+              <a:xfrm>
+                <a:off x="9569657" y="1103200"/>
+                <a:ext cx="375911" cy="221032"/>
+              </a:xfrm>
+              <a:prstGeom prst="line">
+                <a:avLst/>
+              </a:prstGeom>
+              <a:ln>
+                <a:solidFill>
+                  <a:schemeClr val="accent2"/>
+                </a:solidFill>
+              </a:ln>
+            </p:spPr>
+            <p:style>
+              <a:lnRef idx="1">
+                <a:schemeClr val="accent1"/>
+              </a:lnRef>
+              <a:fillRef idx="0">
+                <a:schemeClr val="accent1"/>
+              </a:fillRef>
+              <a:effectRef idx="0">
+                <a:schemeClr val="accent1"/>
+              </a:effectRef>
+              <a:fontRef idx="minor">
+                <a:schemeClr val="tx1"/>
+              </a:fontRef>
+            </p:style>
+          </p:cxnSp>
+        </p:grpSp>
+        <p:sp>
+          <p:nvSpPr>
+            <p:cNvPr id="56" name="Rectangle 55"/>
+            <p:cNvSpPr/>
+            <p:nvPr/>
+          </p:nvSpPr>
+          <p:spPr>
+            <a:xfrm>
+              <a:off x="1079714" y="2125847"/>
+              <a:ext cx="1650727" cy="2562642"/>
+            </a:xfrm>
+            <a:prstGeom prst="rect">
+              <a:avLst/>
+            </a:prstGeom>
+            <a:ln>
+              <a:noFill/>
+            </a:ln>
+          </p:spPr>
+          <p:style>
+            <a:lnRef idx="2">
+              <a:schemeClr val="accent1">
+                <a:shade val="50000"/>
+              </a:schemeClr>
+            </a:lnRef>
+            <a:fillRef idx="1">
+              <a:schemeClr val="accent1"/>
+            </a:fillRef>
+            <a:effectRef idx="0">
+              <a:schemeClr val="accent1"/>
+            </a:effectRef>
+            <a:fontRef idx="minor">
+              <a:schemeClr val="lt1"/>
+            </a:fontRef>
+          </p:style>
+          <p:txBody>
+            <a:bodyPr rtlCol="0" anchor="ctr"/>
+            <a:lstStyle/>
+            <a:p>
+              <a:pPr algn="ctr"/>
+              <a:r>
+                <a:rPr lang="en-US" sz="2400" dirty="0" err="1" smtClean="0"/>
+                <a:t>Polystore</a:t>
+              </a:r>
+              <a:endParaRPr lang="en-US" sz="2400" dirty="0" smtClean="0"/>
+            </a:p>
+            <a:p>
+              <a:pPr algn="ctr"/>
+              <a:r>
+                <a:rPr lang="en-US" sz="2400" dirty="0" smtClean="0"/>
+                <a:t>(</a:t>
+              </a:r>
+              <a:r>
+                <a:rPr lang="en-US" sz="2400" dirty="0" err="1" smtClean="0"/>
+                <a:t>BigDawg</a:t>
+              </a:r>
+              <a:r>
+                <a:rPr lang="en-US" sz="2400" dirty="0" smtClean="0"/>
+                <a:t>)</a:t>
+              </a:r>
+              <a:endParaRPr lang="en-US" sz="2400" dirty="0"/>
+            </a:p>
+          </p:txBody>
+        </p:sp>
+        <p:sp>
+          <p:nvSpPr>
+            <p:cNvPr id="57" name="Rectangle 56"/>
+            <p:cNvSpPr/>
+            <p:nvPr/>
+          </p:nvSpPr>
+          <p:spPr>
+            <a:xfrm>
+              <a:off x="1077132" y="558596"/>
+              <a:ext cx="6307810" cy="1446561"/>
+            </a:xfrm>
+            <a:prstGeom prst="rect">
+              <a:avLst/>
+            </a:prstGeom>
+            <a:ln>
+              <a:noFill/>
+            </a:ln>
+          </p:spPr>
+          <p:style>
+            <a:lnRef idx="2">
+              <a:schemeClr val="accent1">
+                <a:shade val="50000"/>
+              </a:schemeClr>
+            </a:lnRef>
+            <a:fillRef idx="1">
+              <a:schemeClr val="accent1"/>
+            </a:fillRef>
+            <a:effectRef idx="0">
+              <a:schemeClr val="accent1"/>
+            </a:effectRef>
+            <a:fontRef idx="minor">
+              <a:schemeClr val="lt1"/>
+            </a:fontRef>
+          </p:style>
+          <p:txBody>
+            <a:bodyPr tIns="0" bIns="457200" rtlCol="0" anchor="ctr"/>
+            <a:lstStyle/>
+            <a:p>
+              <a:pPr algn="ctr"/>
+              <a:r>
+                <a:rPr lang="en-US" sz="2400" dirty="0" smtClean="0"/>
+                <a:t>Query Processing</a:t>
+              </a:r>
+              <a:endParaRPr lang="en-US" sz="2400" dirty="0"/>
+            </a:p>
+          </p:txBody>
+        </p:sp>
+        <p:sp>
+          <p:nvSpPr>
+            <p:cNvPr id="58" name="Left-Up Arrow 57"/>
+            <p:cNvSpPr/>
+            <p:nvPr/>
+          </p:nvSpPr>
+          <p:spPr>
+            <a:xfrm rot="16200000">
+              <a:off x="7970109" y="575945"/>
+              <a:ext cx="903745" cy="1991083"/>
+            </a:xfrm>
+            <a:prstGeom prst="leftUpArrow">
+              <a:avLst>
+                <a:gd name="adj1" fmla="val 17633"/>
+                <a:gd name="adj2" fmla="val 25000"/>
+                <a:gd name="adj3" fmla="val 25000"/>
+              </a:avLst>
+            </a:prstGeom>
+          </p:spPr>
+          <p:style>
+            <a:lnRef idx="2">
+              <a:schemeClr val="accent1">
+                <a:shade val="50000"/>
+              </a:schemeClr>
+            </a:lnRef>
+            <a:fillRef idx="1">
+              <a:schemeClr val="accent1"/>
+            </a:fillRef>
+            <a:effectRef idx="0">
+              <a:schemeClr val="accent1"/>
+            </a:effectRef>
+            <a:fontRef idx="minor">
+              <a:schemeClr val="lt1"/>
+            </a:fontRef>
+          </p:style>
+          <p:txBody>
+            <a:bodyPr rtlCol="0" anchor="ctr"/>
+            <a:lstStyle/>
+            <a:p>
+              <a:pPr algn="ctr"/>
+              <a:endParaRPr lang="en-US"/>
+            </a:p>
+          </p:txBody>
+        </p:sp>
+        <p:sp>
+          <p:nvSpPr>
+            <p:cNvPr id="28" name="Left-Right Arrow 27"/>
+            <p:cNvSpPr/>
+            <p:nvPr/>
+          </p:nvSpPr>
+          <p:spPr>
+            <a:xfrm>
+              <a:off x="7397322" y="3751065"/>
+              <a:ext cx="673904" cy="371959"/>
+            </a:xfrm>
+            <a:prstGeom prst="leftRightArrow">
+              <a:avLst/>
+            </a:prstGeom>
+          </p:spPr>
+          <p:style>
+            <a:lnRef idx="2">
+              <a:schemeClr val="accent1">
+                <a:shade val="50000"/>
+              </a:schemeClr>
+            </a:lnRef>
+            <a:fillRef idx="1">
+              <a:schemeClr val="accent1"/>
+            </a:fillRef>
+            <a:effectRef idx="0">
+              <a:schemeClr val="accent1"/>
+            </a:effectRef>
+            <a:fontRef idx="minor">
+              <a:schemeClr val="lt1"/>
+            </a:fontRef>
+          </p:style>
+          <p:txBody>
+            <a:bodyPr rtlCol="0" anchor="ctr"/>
+            <a:lstStyle/>
+            <a:p>
+              <a:pPr algn="ctr"/>
+              <a:endParaRPr lang="en-US"/>
+            </a:p>
+          </p:txBody>
+        </p:sp>
+        <p:sp>
+          <p:nvSpPr>
+            <p:cNvPr id="32" name="Rectangle 31"/>
+            <p:cNvSpPr/>
+            <p:nvPr/>
+          </p:nvSpPr>
+          <p:spPr>
+            <a:xfrm>
+              <a:off x="1077132" y="4630697"/>
+              <a:ext cx="6307810" cy="556470"/>
+            </a:xfrm>
+            <a:prstGeom prst="rect">
+              <a:avLst/>
+            </a:prstGeom>
+            <a:ln>
+              <a:noFill/>
+            </a:ln>
+          </p:spPr>
+          <p:style>
+            <a:lnRef idx="2">
+              <a:schemeClr val="accent1">
+                <a:shade val="50000"/>
+              </a:schemeClr>
+            </a:lnRef>
+            <a:fillRef idx="1">
+              <a:schemeClr val="accent1"/>
+            </a:fillRef>
+            <a:effectRef idx="0">
+              <a:schemeClr val="accent1"/>
+            </a:effectRef>
+            <a:fontRef idx="minor">
+              <a:schemeClr val="lt1"/>
+            </a:fontRef>
+          </p:style>
+          <p:txBody>
+            <a:bodyPr rtlCol="0" anchor="ctr"/>
+            <a:lstStyle/>
+            <a:p>
+              <a:pPr algn="ctr"/>
+              <a:endParaRPr lang="en-US" sz="2400" dirty="0"/>
+            </a:p>
+          </p:txBody>
+        </p:sp>
+        <p:sp>
+          <p:nvSpPr>
+            <p:cNvPr id="42" name="Rounded Rectangle 41"/>
+            <p:cNvSpPr/>
+            <p:nvPr/>
+          </p:nvSpPr>
+          <p:spPr>
+            <a:xfrm>
+              <a:off x="2903510" y="3799115"/>
+              <a:ext cx="1911147" cy="637549"/>
+            </a:xfrm>
+            <a:prstGeom prst="roundRect">
+              <a:avLst/>
+            </a:prstGeom>
+            <a:ln>
+              <a:solidFill>
+                <a:schemeClr val="accent5"/>
+              </a:solidFill>
+            </a:ln>
+          </p:spPr>
+          <p:style>
+            <a:lnRef idx="2">
+              <a:schemeClr val="accent1">
+                <a:shade val="50000"/>
+              </a:schemeClr>
+            </a:lnRef>
+            <a:fillRef idx="1">
+              <a:schemeClr val="accent1"/>
+            </a:fillRef>
+            <a:effectRef idx="0">
+              <a:schemeClr val="accent1"/>
+            </a:effectRef>
+            <a:fontRef idx="minor">
+              <a:schemeClr val="lt1"/>
+            </a:fontRef>
+          </p:style>
+          <p:txBody>
+            <a:bodyPr rtlCol="0" anchor="ctr"/>
+            <a:lstStyle/>
+            <a:p>
+              <a:pPr algn="ctr"/>
+              <a:r>
+                <a:rPr lang="en-US" dirty="0" smtClean="0"/>
+                <a:t>Profiler</a:t>
+              </a:r>
+              <a:endParaRPr lang="en-US" dirty="0"/>
+            </a:p>
+          </p:txBody>
+        </p:sp>
+        <p:sp>
+          <p:nvSpPr>
+            <p:cNvPr id="43" name="Rounded Rectangle 42"/>
+            <p:cNvSpPr/>
+            <p:nvPr/>
+          </p:nvSpPr>
+          <p:spPr>
+            <a:xfrm>
+              <a:off x="4959151" y="3800202"/>
+              <a:ext cx="2349832" cy="662676"/>
+            </a:xfrm>
+            <a:prstGeom prst="roundRect">
+              <a:avLst/>
+            </a:prstGeom>
+            <a:ln>
+              <a:solidFill>
+                <a:schemeClr val="accent5"/>
+              </a:solidFill>
+            </a:ln>
+          </p:spPr>
+          <p:style>
+            <a:lnRef idx="2">
+              <a:schemeClr val="accent1">
+                <a:shade val="50000"/>
+              </a:schemeClr>
+            </a:lnRef>
+            <a:fillRef idx="1">
+              <a:schemeClr val="accent1"/>
+            </a:fillRef>
+            <a:effectRef idx="0">
+              <a:schemeClr val="accent1"/>
+            </a:effectRef>
+            <a:fontRef idx="minor">
+              <a:schemeClr val="lt1"/>
+            </a:fontRef>
+          </p:style>
+          <p:txBody>
+            <a:bodyPr rtlCol="0" anchor="ctr"/>
+            <a:lstStyle/>
+            <a:p>
+              <a:pPr algn="ctr"/>
+              <a:r>
+                <a:rPr lang="en-US" dirty="0" smtClean="0"/>
+                <a:t>Graph Builder</a:t>
+              </a:r>
+              <a:endParaRPr lang="en-US" dirty="0"/>
+            </a:p>
+          </p:txBody>
+        </p:sp>
+        <p:sp>
+          <p:nvSpPr>
+            <p:cNvPr id="44" name="Rounded Rectangle 43"/>
+            <p:cNvSpPr/>
+            <p:nvPr/>
+          </p:nvSpPr>
+          <p:spPr>
+            <a:xfrm>
+              <a:off x="1178958" y="1299734"/>
+              <a:ext cx="1829392" cy="603504"/>
+            </a:xfrm>
+            <a:prstGeom prst="roundRect">
+              <a:avLst/>
+            </a:prstGeom>
+            <a:ln>
+              <a:solidFill>
+                <a:schemeClr val="accent5"/>
+              </a:solidFill>
+            </a:ln>
+          </p:spPr>
+          <p:style>
+            <a:lnRef idx="2">
+              <a:schemeClr val="accent1">
+                <a:shade val="50000"/>
+              </a:schemeClr>
+            </a:lnRef>
+            <a:fillRef idx="1">
+              <a:schemeClr val="accent1"/>
+            </a:fillRef>
+            <a:effectRef idx="0">
+              <a:schemeClr val="accent1"/>
+            </a:effectRef>
+            <a:fontRef idx="minor">
+              <a:schemeClr val="lt1"/>
+            </a:fontRef>
+          </p:style>
+          <p:txBody>
+            <a:bodyPr rtlCol="0" anchor="ctr"/>
+            <a:lstStyle/>
+            <a:p>
+              <a:pPr algn="ctr"/>
+              <a:r>
+                <a:rPr lang="en-US" dirty="0" smtClean="0"/>
+                <a:t>Workflow Optimizer</a:t>
+              </a:r>
+              <a:endParaRPr lang="en-US" dirty="0"/>
+            </a:p>
+          </p:txBody>
+        </p:sp>
+      </p:grpSp>
+      <p:sp>
+        <p:nvSpPr>
+          <p:cNvPr id="37" name="Rectangle 36"/>
+          <p:cNvSpPr/>
+          <p:nvPr/>
+        </p:nvSpPr>
+        <p:spPr>
+          <a:xfrm>
+            <a:off x="2809288" y="2128160"/>
+            <a:ext cx="4588572" cy="1135201"/>
+          </a:xfrm>
+          <a:prstGeom prst="rect">
+            <a:avLst/>
+          </a:prstGeom>
+          <a:ln>
+            <a:noFill/>
+          </a:ln>
+        </p:spPr>
+        <p:style>
+          <a:lnRef idx="2">
+            <a:schemeClr val="accent1">
+              <a:shade val="50000"/>
+            </a:schemeClr>
+          </a:lnRef>
+          <a:fillRef idx="1">
+            <a:schemeClr val="accent1"/>
+          </a:fillRef>
+          <a:effectRef idx="0">
+            <a:schemeClr val="accent1"/>
+          </a:effectRef>
+          <a:fontRef idx="minor">
+            <a:schemeClr val="lt1"/>
+          </a:fontRef>
+        </p:style>
+        <p:txBody>
+          <a:bodyPr tIns="0" bIns="1005840" rtlCol="0" anchor="ctr"/>
+          <a:lstStyle/>
+          <a:p>
+            <a:pPr algn="ctr"/>
+            <a:endParaRPr lang="en-US" sz="2400" dirty="0" smtClean="0"/>
+          </a:p>
+          <a:p>
+            <a:pPr algn="ctr"/>
+            <a:r>
+              <a:rPr lang="en-US" sz="2400" dirty="0" smtClean="0"/>
+              <a:t>Linkage</a:t>
+            </a:r>
+            <a:endParaRPr lang="en-US" sz="2400" dirty="0"/>
+          </a:p>
+        </p:txBody>
+      </p:sp>
+      <p:sp>
+        <p:nvSpPr>
+          <p:cNvPr id="45" name="Rounded Rectangle 44"/>
+          <p:cNvSpPr/>
+          <p:nvPr/>
+        </p:nvSpPr>
+        <p:spPr>
+          <a:xfrm>
+            <a:off x="5186919" y="2557430"/>
+            <a:ext cx="2038185" cy="643180"/>
+          </a:xfrm>
+          <a:prstGeom prst="roundRect">
+            <a:avLst/>
+          </a:prstGeom>
+          <a:ln>
+            <a:solidFill>
+              <a:schemeClr val="accent5"/>
+            </a:solidFill>
+          </a:ln>
+        </p:spPr>
+        <p:style>
+          <a:lnRef idx="2">
+            <a:schemeClr val="accent1">
+              <a:shade val="50000"/>
+            </a:schemeClr>
+          </a:lnRef>
+          <a:fillRef idx="1">
+            <a:schemeClr val="accent1"/>
+          </a:fillRef>
+          <a:effectRef idx="0">
+            <a:schemeClr val="accent1"/>
+          </a:effectRef>
+          <a:fontRef idx="minor">
+            <a:schemeClr val="lt1"/>
+          </a:fontRef>
+        </p:style>
+        <p:txBody>
+          <a:bodyPr rtlCol="0" anchor="ctr"/>
+          <a:lstStyle/>
+          <a:p>
+            <a:pPr algn="ctr"/>
+            <a:r>
+              <a:rPr lang="en-US" dirty="0" smtClean="0"/>
+              <a:t>FK-PK Refiner</a:t>
+            </a:r>
+            <a:endParaRPr lang="en-US" dirty="0"/>
+          </a:p>
+        </p:txBody>
+      </p:sp>
+      <p:sp>
+        <p:nvSpPr>
+          <p:cNvPr id="82" name="Rounded Rectangle 81"/>
+          <p:cNvSpPr/>
+          <p:nvPr/>
+        </p:nvSpPr>
+        <p:spPr>
+          <a:xfrm>
+            <a:off x="2938291" y="2557430"/>
+            <a:ext cx="1876366" cy="643180"/>
+          </a:xfrm>
+          <a:prstGeom prst="roundRect">
+            <a:avLst/>
+          </a:prstGeom>
+          <a:ln>
+            <a:solidFill>
+              <a:schemeClr val="accent5"/>
+            </a:solidFill>
+          </a:ln>
+        </p:spPr>
+        <p:style>
+          <a:lnRef idx="2">
+            <a:schemeClr val="accent1">
+              <a:shade val="50000"/>
+            </a:schemeClr>
+          </a:lnRef>
+          <a:fillRef idx="1">
+            <a:schemeClr val="accent1"/>
+          </a:fillRef>
+          <a:effectRef idx="0">
+            <a:schemeClr val="accent1"/>
+          </a:effectRef>
+          <a:fontRef idx="minor">
+            <a:schemeClr val="lt1"/>
+          </a:fontRef>
+        </p:style>
+        <p:txBody>
+          <a:bodyPr rtlCol="0" anchor="ctr"/>
+          <a:lstStyle/>
+          <a:p>
+            <a:pPr algn="ctr"/>
+            <a:r>
+              <a:rPr lang="en-US" dirty="0" smtClean="0"/>
+              <a:t>Cleanliness Estimator</a:t>
+            </a:r>
+            <a:endParaRPr lang="en-US" dirty="0"/>
+          </a:p>
+        </p:txBody>
+      </p:sp>
+      <p:sp>
+        <p:nvSpPr>
+          <p:cNvPr id="83" name="Rounded Rectangle 82"/>
+          <p:cNvSpPr/>
+          <p:nvPr/>
+        </p:nvSpPr>
+        <p:spPr>
+          <a:xfrm>
+            <a:off x="3270325" y="1299734"/>
+            <a:ext cx="1829392" cy="603504"/>
+          </a:xfrm>
+          <a:prstGeom prst="roundRect">
+            <a:avLst/>
+          </a:prstGeom>
+          <a:ln>
+            <a:solidFill>
+              <a:schemeClr val="accent5"/>
+            </a:solidFill>
+          </a:ln>
+        </p:spPr>
+        <p:style>
+          <a:lnRef idx="2">
+            <a:schemeClr val="accent1">
+              <a:shade val="50000"/>
+            </a:schemeClr>
+          </a:lnRef>
+          <a:fillRef idx="1">
+            <a:schemeClr val="accent1"/>
+          </a:fillRef>
+          <a:effectRef idx="0">
+            <a:schemeClr val="accent1"/>
+          </a:effectRef>
+          <a:fontRef idx="minor">
+            <a:schemeClr val="lt1"/>
+          </a:fontRef>
+        </p:style>
+        <p:txBody>
+          <a:bodyPr rtlCol="0" anchor="ctr"/>
+          <a:lstStyle/>
+          <a:p>
+            <a:pPr algn="ctr"/>
+            <a:r>
+              <a:rPr lang="en-US" dirty="0" smtClean="0"/>
+              <a:t>Query</a:t>
+            </a:r>
+          </a:p>
+          <a:p>
+            <a:pPr algn="ctr"/>
+            <a:r>
+              <a:rPr lang="en-US" dirty="0" smtClean="0"/>
+              <a:t>Processor</a:t>
+            </a:r>
+            <a:endParaRPr lang="en-US" dirty="0"/>
+          </a:p>
+        </p:txBody>
+      </p:sp>
+      <p:sp>
+        <p:nvSpPr>
+          <p:cNvPr id="84" name="Rounded Rectangle 83"/>
+          <p:cNvSpPr/>
+          <p:nvPr/>
+        </p:nvSpPr>
+        <p:spPr>
+          <a:xfrm>
+            <a:off x="5322194" y="1299734"/>
+            <a:ext cx="1829392" cy="603504"/>
+          </a:xfrm>
+          <a:prstGeom prst="roundRect">
+            <a:avLst/>
+          </a:prstGeom>
+          <a:ln>
+            <a:solidFill>
+              <a:schemeClr val="accent5"/>
+            </a:solidFill>
+          </a:ln>
+        </p:spPr>
+        <p:style>
+          <a:lnRef idx="2">
+            <a:schemeClr val="accent1">
+              <a:shade val="50000"/>
+            </a:schemeClr>
+          </a:lnRef>
+          <a:fillRef idx="1">
+            <a:schemeClr val="accent1"/>
+          </a:fillRef>
+          <a:effectRef idx="0">
+            <a:schemeClr val="accent1"/>
+          </a:effectRef>
+          <a:fontRef idx="minor">
+            <a:schemeClr val="lt1"/>
+          </a:fontRef>
+        </p:style>
+        <p:txBody>
+          <a:bodyPr rtlCol="0" anchor="ctr"/>
+          <a:lstStyle/>
+          <a:p>
+            <a:pPr algn="ctr"/>
+            <a:r>
+              <a:rPr lang="en-US" dirty="0" smtClean="0"/>
+              <a:t>Quality Controller</a:t>
+            </a:r>
+            <a:endParaRPr lang="en-US" dirty="0"/>
+          </a:p>
+        </p:txBody>
+      </p:sp>
+      <p:sp>
+        <p:nvSpPr>
+          <p:cNvPr id="85" name="Left-Right Arrow 84"/>
+          <p:cNvSpPr/>
+          <p:nvPr/>
+        </p:nvSpPr>
+        <p:spPr>
+          <a:xfrm>
+            <a:off x="7404594" y="2551492"/>
+            <a:ext cx="673904" cy="371959"/>
+          </a:xfrm>
+          <a:prstGeom prst="leftRightArrow">
+            <a:avLst/>
+          </a:prstGeom>
+        </p:spPr>
+        <p:style>
+          <a:lnRef idx="2">
+            <a:schemeClr val="accent1">
+              <a:shade val="50000"/>
+            </a:schemeClr>
+          </a:lnRef>
+          <a:fillRef idx="1">
+            <a:schemeClr val="accent1"/>
+          </a:fillRef>
+          <a:effectRef idx="0">
+            <a:schemeClr val="accent1"/>
+          </a:effectRef>
+          <a:fontRef idx="minor">
+            <a:schemeClr val="lt1"/>
+          </a:fontRef>
+        </p:style>
+        <p:txBody>
+          <a:bodyPr rtlCol="0" anchor="ctr"/>
+          <a:lstStyle/>
+          <a:p>
+            <a:pPr algn="ctr"/>
+            <a:endParaRPr lang="en-US"/>
+          </a:p>
+        </p:txBody>
+      </p:sp>
+    </p:spTree>
+    <p:extLst>
+      <p:ext uri="{BB962C8B-B14F-4D97-AF65-F5344CB8AC3E}">
+        <p14:creationId xmlns:p14="http://schemas.microsoft.com/office/powerpoint/2010/main" val="2068713091"/>
+      </p:ext>
+    </p:extLst>
+  </p:cSld>
+  <p:clrMapOvr>
+    <a:masterClrMapping/>
+  </p:clrMapOvr>
+</p:sld>
+</file>
+
 <file path=ppt/theme/theme1.xml><?xml version="1.0" encoding="utf-8"?>
 <a:theme xmlns:a="http://schemas.openxmlformats.org/drawingml/2006/main" name="Office Theme">
   <a:themeElements>

</xml_diff>

<commit_message>
Adding figure from ppt
</commit_message>
<xml_diff>
--- a/figs.pptx
+++ b/figs.pptx
@@ -7017,7 +7017,11 @@
               <a:pPr algn="ctr"/>
               <a:r>
                 <a:rPr lang="en-US" dirty="0" smtClean="0"/>
-                <a:t>Workflow Optimizer</a:t>
+                <a:t>Workflow </a:t>
+              </a:r>
+              <a:r>
+                <a:rPr lang="en-US" dirty="0" smtClean="0"/>
+                <a:t>Orchestrator</a:t>
               </a:r>
               <a:endParaRPr lang="en-US" dirty="0"/>
             </a:p>

</xml_diff>